<commit_message>
Final commit - Adir Cohen
</commit_message>
<xml_diff>
--- a/Final Presentation/Final Presentation.pptx
+++ b/Final Presentation/Final Presentation.pptx
@@ -3325,26 +3325,6 @@
           </a:p>
           <a:p>
             <a:pPr rtl="0"/>
-            <a:r>
-              <a:rPr lang="en-US" sz="2400" b="1" dirty="0">
-                <a:solidFill>
-                  <a:srgbClr val="002060"/>
-                </a:solidFill>
-              </a:rPr>
-              <a:t>In collaboration with</a:t>
-            </a:r>
-            <a:r>
-              <a:rPr lang="en-US" sz="2400" b="1" dirty="0" smtClean="0">
-                <a:solidFill>
-                  <a:srgbClr val="002060"/>
-                </a:solidFill>
-              </a:rPr>
-              <a:t>:</a:t>
-            </a:r>
-            <a:endParaRPr lang="en-US" sz="2400" dirty="0"/>
-          </a:p>
-          <a:p>
-            <a:pPr rtl="0"/>
             <a:endParaRPr lang="he-IL" sz="2400" dirty="0"/>
           </a:p>
           <a:p>
@@ -3365,45 +3345,6 @@
           </a:p>
         </p:txBody>
       </p:sp>
-      <p:pic>
-        <p:nvPicPr>
-          <p:cNvPr id="1026" name="Picture 2" descr="Rafael Advanced Defense Systems - Crunchbase Company Profile &amp; Funding"/>
-          <p:cNvPicPr>
-            <a:picLocks noChangeAspect="1" noChangeArrowheads="1"/>
-          </p:cNvPicPr>
-          <p:nvPr/>
-        </p:nvPicPr>
-        <p:blipFill rotWithShape="1">
-          <a:blip r:embed="rId3">
-            <a:extLst>
-              <a:ext uri="{28A0092B-C50C-407E-A947-70E740481C1C}">
-                <a14:useLocalDpi xmlns:a14="http://schemas.microsoft.com/office/drawing/2010/main" val="0"/>
-              </a:ext>
-            </a:extLst>
-          </a:blip>
-          <a:srcRect t="40828" b="33036"/>
-          <a:stretch/>
-        </p:blipFill>
-        <p:spPr bwMode="auto">
-          <a:xfrm>
-            <a:off x="7086600" y="5444837"/>
-            <a:ext cx="2438400" cy="637309"/>
-          </a:xfrm>
-          <a:prstGeom prst="rect">
-            <a:avLst/>
-          </a:prstGeom>
-          <a:noFill/>
-          <a:extLst>
-            <a:ext uri="{909E8E84-426E-40DD-AFC4-6F175D3DCCD1}">
-              <a14:hiddenFill xmlns:a14="http://schemas.microsoft.com/office/drawing/2010/main">
-                <a:solidFill>
-                  <a:srgbClr val="FFFFFF"/>
-                </a:solidFill>
-              </a14:hiddenFill>
-            </a:ext>
-          </a:extLst>
-        </p:spPr>
-      </p:pic>
     </p:spTree>
     <p:extLst>
       <p:ext uri="{BB962C8B-B14F-4D97-AF65-F5344CB8AC3E}">
@@ -14900,8 +14841,8 @@
             </a:fontRef>
           </p:style>
         </p:cxnSp>
-        <mc:AlternateContent xmlns:mc="http://schemas.openxmlformats.org/markup-compatibility/2006">
-          <mc:Choice xmlns:a14="http://schemas.microsoft.com/office/drawing/2010/main" Requires="a14">
+        <mc:AlternateContent xmlns:mc="http://schemas.openxmlformats.org/markup-compatibility/2006" xmlns:a14="http://schemas.microsoft.com/office/drawing/2010/main">
+          <mc:Choice Requires="a14">
             <p:sp>
               <p:nvSpPr>
                 <p:cNvPr id="13" name="מלבן 12"/>
@@ -14981,7 +14922,7 @@
               </p:txBody>
             </p:sp>
           </mc:Choice>
-          <mc:Fallback>
+          <mc:Fallback xmlns="">
             <p:sp>
               <p:nvSpPr>
                 <p:cNvPr id="13" name="מלבן 12"/>
@@ -15020,8 +14961,8 @@
             </p:sp>
           </mc:Fallback>
         </mc:AlternateContent>
-        <mc:AlternateContent xmlns:mc="http://schemas.openxmlformats.org/markup-compatibility/2006">
-          <mc:Choice xmlns:a14="http://schemas.microsoft.com/office/drawing/2010/main" Requires="a14">
+        <mc:AlternateContent xmlns:mc="http://schemas.openxmlformats.org/markup-compatibility/2006" xmlns:a14="http://schemas.microsoft.com/office/drawing/2010/main">
+          <mc:Choice Requires="a14">
             <p:sp>
               <p:nvSpPr>
                 <p:cNvPr id="14" name="מלבן 13"/>
@@ -15199,7 +15140,7 @@
               </p:txBody>
             </p:sp>
           </mc:Choice>
-          <mc:Fallback>
+          <mc:Fallback xmlns="">
             <p:sp>
               <p:nvSpPr>
                 <p:cNvPr id="14" name="מלבן 13"/>
@@ -29235,8 +29176,8 @@
           </a:p>
         </p:txBody>
       </p:sp>
-      <mc:AlternateContent xmlns:mc="http://schemas.openxmlformats.org/markup-compatibility/2006">
-        <mc:Choice xmlns:a14="http://schemas.microsoft.com/office/drawing/2010/main" Requires="a14">
+      <mc:AlternateContent xmlns:mc="http://schemas.openxmlformats.org/markup-compatibility/2006" xmlns:a14="http://schemas.microsoft.com/office/drawing/2010/main">
+        <mc:Choice Requires="a14">
           <p:graphicFrame>
             <p:nvGraphicFramePr>
               <p:cNvPr id="3" name="טבלה 2"/>
@@ -29880,13 +29821,7 @@
                             <a:rPr lang="en-US" sz="2100" dirty="0" smtClean="0">
                               <a:effectLst/>
                             </a:rPr>
-                            <a:t>-</a:t>
-                          </a:r>
-                          <a:r>
-                            <a:rPr lang="en-US" sz="2100" dirty="0" smtClean="0">
-                              <a:effectLst/>
-                            </a:rPr>
-                            <a:t>17.4 </a:t>
+                            <a:t>-17.4 </a:t>
                           </a:r>
                           <a:r>
                             <a:rPr lang="en-US" sz="2100" dirty="0">
@@ -30065,7 +30000,7 @@
             </a:graphic>
           </p:graphicFrame>
         </mc:Choice>
-        <mc:Fallback>
+        <mc:Fallback xmlns="">
           <p:graphicFrame>
             <p:nvGraphicFramePr>
               <p:cNvPr id="3" name="טבלה 2"/>

</xml_diff>